<commit_message>
added demo sketch 2
</commit_message>
<xml_diff>
--- a/demo_sketch.pptx
+++ b/demo_sketch.pptx
@@ -2997,6 +2997,11 @@
               <a:avLst/>
             </a:prstGeom>
             <a:noFill/>
+            <a:ln>
+              <a:solidFill>
+                <a:srgbClr val="00FA00"/>
+              </a:solidFill>
+            </a:ln>
           </p:spPr>
           <p:style>
             <a:lnRef idx="2">
@@ -3040,6 +3045,11 @@
               <a:avLst/>
             </a:prstGeom>
             <a:noFill/>
+            <a:ln>
+              <a:solidFill>
+                <a:srgbClr val="00FA00"/>
+              </a:solidFill>
+            </a:ln>
           </p:spPr>
           <p:style>
             <a:lnRef idx="2">
@@ -3089,6 +3099,9 @@
               <a:avLst/>
             </a:prstGeom>
             <a:noFill/>
+            <a:ln>
+              <a:noFill/>
+            </a:ln>
           </p:spPr>
           <p:txBody>
             <a:bodyPr wrap="square" rtlCol="0">
@@ -3151,6 +3164,11 @@
               <a:avLst/>
             </a:prstGeom>
             <a:noFill/>
+            <a:ln>
+              <a:solidFill>
+                <a:srgbClr val="00FA00"/>
+              </a:solidFill>
+            </a:ln>
           </p:spPr>
           <p:style>
             <a:lnRef idx="2">
@@ -3194,6 +3212,11 @@
               <a:avLst/>
             </a:prstGeom>
             <a:noFill/>
+            <a:ln>
+              <a:solidFill>
+                <a:srgbClr val="00FA00"/>
+              </a:solidFill>
+            </a:ln>
           </p:spPr>
           <p:style>
             <a:lnRef idx="2">
@@ -3243,6 +3266,9 @@
               <a:avLst/>
             </a:prstGeom>
             <a:noFill/>
+            <a:ln>
+              <a:noFill/>
+            </a:ln>
           </p:spPr>
           <p:txBody>
             <a:bodyPr wrap="square" rtlCol="0">
@@ -3290,13 +3316,16 @@
         </p:nvCxnSpPr>
         <p:spPr>
           <a:xfrm flipH="1">
-            <a:off x="7637360" y="1640740"/>
+            <a:off x="7637360" y="1560499"/>
             <a:ext cx="1599235" cy="9262"/>
           </a:xfrm>
           <a:prstGeom prst="straightConnector1">
             <a:avLst/>
           </a:prstGeom>
           <a:ln>
+            <a:solidFill>
+              <a:srgbClr val="00FA00"/>
+            </a:solidFill>
             <a:headEnd type="triangle"/>
             <a:tailEnd type="triangle"/>
           </a:ln>
@@ -3359,6 +3388,11 @@
                 <a:avLst/>
               </a:prstGeom>
               <a:noFill/>
+              <a:ln>
+                <a:solidFill>
+                  <a:srgbClr val="00FA00"/>
+                </a:solidFill>
+              </a:ln>
             </p:spPr>
             <p:style>
               <a:lnRef idx="2">
@@ -3402,6 +3436,11 @@
                 <a:avLst/>
               </a:prstGeom>
               <a:noFill/>
+              <a:ln>
+                <a:solidFill>
+                  <a:srgbClr val="00FA00"/>
+                </a:solidFill>
+              </a:ln>
             </p:spPr>
             <p:style>
               <a:lnRef idx="2">
@@ -3457,6 +3496,9 @@
                 <a:avLst/>
               </a:prstGeom>
               <a:noFill/>
+              <a:ln>
+                <a:noFill/>
+              </a:ln>
             </p:spPr>
             <p:txBody>
               <a:bodyPr wrap="square" rtlCol="0">
@@ -3499,6 +3541,11 @@
               <a:avLst/>
             </a:prstGeom>
             <a:noFill/>
+            <a:ln>
+              <a:solidFill>
+                <a:srgbClr val="00FA00"/>
+              </a:solidFill>
+            </a:ln>
           </p:spPr>
           <p:style>
             <a:lnRef idx="2">
@@ -3554,6 +3601,11 @@
               <a:avLst/>
             </a:prstGeom>
             <a:noFill/>
+            <a:ln>
+              <a:solidFill>
+                <a:srgbClr val="00FA00"/>
+              </a:solidFill>
+            </a:ln>
           </p:spPr>
           <p:style>
             <a:lnRef idx="2">
@@ -3609,6 +3661,11 @@
               <a:avLst/>
             </a:prstGeom>
             <a:noFill/>
+            <a:ln>
+              <a:solidFill>
+                <a:srgbClr val="00FA00"/>
+              </a:solidFill>
+            </a:ln>
           </p:spPr>
           <p:style>
             <a:lnRef idx="2">
@@ -3667,6 +3724,9 @@
               <a:avLst/>
             </a:prstGeom>
             <a:ln>
+              <a:solidFill>
+                <a:srgbClr val="00FA00"/>
+              </a:solidFill>
               <a:headEnd type="triangle"/>
               <a:tailEnd type="triangle"/>
             </a:ln>
@@ -3704,6 +3764,9 @@
               <a:avLst/>
             </a:prstGeom>
             <a:ln>
+              <a:solidFill>
+                <a:srgbClr val="00FA00"/>
+              </a:solidFill>
               <a:headEnd type="triangle"/>
               <a:tailEnd type="triangle"/>
             </a:ln>
@@ -3741,6 +3804,9 @@
               <a:avLst/>
             </a:prstGeom>
             <a:ln>
+              <a:solidFill>
+                <a:srgbClr val="00FA00"/>
+              </a:solidFill>
               <a:headEnd type="triangle"/>
               <a:tailEnd type="triangle"/>
             </a:ln>
@@ -3778,6 +3844,9 @@
               <a:avLst/>
             </a:prstGeom>
             <a:ln>
+              <a:solidFill>
+                <a:srgbClr val="00FA00"/>
+              </a:solidFill>
               <a:headEnd type="triangle"/>
               <a:tailEnd type="triangle"/>
             </a:ln>
@@ -3812,6 +3881,9 @@
               <a:avLst/>
             </a:prstGeom>
             <a:ln>
+              <a:solidFill>
+                <a:srgbClr val="00FA00"/>
+              </a:solidFill>
               <a:headEnd type="triangle"/>
               <a:tailEnd type="triangle"/>
             </a:ln>
@@ -3846,6 +3918,9 @@
               <a:avLst/>
             </a:prstGeom>
             <a:ln>
+              <a:solidFill>
+                <a:srgbClr val="00FA00"/>
+              </a:solidFill>
               <a:headEnd type="triangle"/>
               <a:tailEnd type="triangle"/>
             </a:ln>
@@ -3883,6 +3958,9 @@
             <a:avLst/>
           </a:prstGeom>
           <a:ln>
+            <a:solidFill>
+              <a:srgbClr val="00FA00"/>
+            </a:solidFill>
             <a:headEnd type="triangle"/>
             <a:tailEnd type="triangle"/>
           </a:ln>
@@ -3917,6 +3995,9 @@
             <a:avLst/>
           </a:prstGeom>
           <a:noFill/>
+          <a:ln>
+            <a:noFill/>
+          </a:ln>
         </p:spPr>
         <p:txBody>
           <a:bodyPr wrap="square" rtlCol="0">
@@ -3980,6 +4061,11 @@
                 <a:avLst/>
               </a:prstGeom>
               <a:noFill/>
+              <a:ln>
+                <a:solidFill>
+                  <a:srgbClr val="00FA00"/>
+                </a:solidFill>
+              </a:ln>
             </p:spPr>
             <p:style>
               <a:lnRef idx="2">
@@ -4016,13 +4102,18 @@
             </p:nvSpPr>
             <p:spPr>
               <a:xfrm>
-                <a:off x="4734045" y="2304326"/>
-                <a:ext cx="2176041" cy="553448"/>
+                <a:off x="4734045" y="2257884"/>
+                <a:ext cx="2176041" cy="495172"/>
               </a:xfrm>
               <a:prstGeom prst="rect">
                 <a:avLst/>
               </a:prstGeom>
               <a:noFill/>
+              <a:ln>
+                <a:solidFill>
+                  <a:srgbClr val="00FA00"/>
+                </a:solidFill>
+              </a:ln>
             </p:spPr>
             <p:style>
               <a:lnRef idx="2">
@@ -4072,6 +4163,11 @@
                 <a:avLst/>
               </a:prstGeom>
               <a:noFill/>
+              <a:ln>
+                <a:solidFill>
+                  <a:srgbClr val="00FA00"/>
+                </a:solidFill>
+              </a:ln>
             </p:spPr>
             <p:style>
               <a:lnRef idx="2">
@@ -4121,6 +4217,9 @@
                 <a:avLst/>
               </a:prstGeom>
               <a:noFill/>
+              <a:ln>
+                <a:noFill/>
+              </a:ln>
             </p:spPr>
             <p:txBody>
               <a:bodyPr wrap="square" rtlCol="0">
@@ -4133,7 +4232,7 @@
                   <a:rPr lang="en-US" dirty="0" smtClean="0">
                     <a:latin typeface="+mj-lt"/>
                   </a:rPr>
-                  <a:t>HP Laptop</a:t>
+                  <a:t>Brand Server</a:t>
                 </a:r>
                 <a:endParaRPr lang="en-US" dirty="0">
                   <a:latin typeface="+mj-lt"/>
@@ -4150,13 +4249,18 @@
           </p:nvSpPr>
           <p:spPr>
             <a:xfrm>
-              <a:off x="5186417" y="1970428"/>
-              <a:ext cx="2176041" cy="581130"/>
+              <a:off x="5186417" y="1800828"/>
+              <a:ext cx="2176041" cy="750730"/>
             </a:xfrm>
             <a:prstGeom prst="rect">
               <a:avLst/>
             </a:prstGeom>
             <a:noFill/>
+            <a:ln>
+              <a:solidFill>
+                <a:srgbClr val="00FA00"/>
+              </a:solidFill>
+            </a:ln>
           </p:spPr>
           <p:style>
             <a:lnRef idx="2">
@@ -4235,6 +4339,11 @@
                 <a:avLst/>
               </a:prstGeom>
               <a:noFill/>
+              <a:ln>
+                <a:solidFill>
+                  <a:srgbClr val="00FA00"/>
+                </a:solidFill>
+              </a:ln>
             </p:spPr>
             <p:style>
               <a:lnRef idx="2">
@@ -4280,6 +4389,11 @@
               <a:solidFill>
                 <a:schemeClr val="bg1"/>
               </a:solidFill>
+              <a:ln>
+                <a:solidFill>
+                  <a:srgbClr val="00FA00"/>
+                </a:solidFill>
+              </a:ln>
             </p:spPr>
             <p:style>
               <a:lnRef idx="2">
@@ -4323,6 +4437,9 @@
                 <a:avLst/>
               </a:prstGeom>
               <a:noFill/>
+              <a:ln>
+                <a:noFill/>
+              </a:ln>
             </p:spPr>
             <p:txBody>
               <a:bodyPr wrap="square" rtlCol="0">
@@ -4361,6 +4478,11 @@
             <a:solidFill>
               <a:schemeClr val="bg1"/>
             </a:solidFill>
+            <a:ln>
+              <a:solidFill>
+                <a:srgbClr val="00FA00"/>
+              </a:solidFill>
+            </a:ln>
           </p:spPr>
           <p:style>
             <a:lnRef idx="2">
@@ -4412,6 +4534,11 @@
             <a:solidFill>
               <a:schemeClr val="bg1"/>
             </a:solidFill>
+            <a:ln>
+              <a:solidFill>
+                <a:srgbClr val="00FA00"/>
+              </a:solidFill>
+            </a:ln>
           </p:spPr>
           <p:style>
             <a:lnRef idx="2">
@@ -4455,13 +4582,16 @@
         </p:nvCxnSpPr>
         <p:spPr>
           <a:xfrm flipV="1">
-            <a:off x="3807350" y="2757657"/>
+            <a:off x="3807350" y="2682583"/>
             <a:ext cx="1634674" cy="13555"/>
           </a:xfrm>
           <a:prstGeom prst="straightConnector1">
             <a:avLst/>
           </a:prstGeom>
           <a:ln>
+            <a:solidFill>
+              <a:srgbClr val="00FA00"/>
+            </a:solidFill>
             <a:headEnd type="triangle"/>
             <a:tailEnd type="triangle"/>
           </a:ln>
@@ -4496,6 +4626,9 @@
             <a:avLst/>
           </a:prstGeom>
           <a:noFill/>
+          <a:ln>
+            <a:noFill/>
+          </a:ln>
         </p:spPr>
         <p:txBody>
           <a:bodyPr wrap="square" rtlCol="0">
@@ -4528,20 +4661,21 @@
       <p:cxnSp>
         <p:nvCxnSpPr>
           <p:cNvPr id="75" name="Elbow Connector 74"/>
-          <p:cNvCxnSpPr>
-            <a:stCxn id="19" idx="1"/>
-          </p:cNvCxnSpPr>
+          <p:cNvCxnSpPr/>
           <p:nvPr/>
         </p:nvCxnSpPr>
         <p:spPr>
           <a:xfrm rot="10800000">
-            <a:off x="7637360" y="2007535"/>
+            <a:off x="7637360" y="1903049"/>
             <a:ext cx="1578014" cy="1320157"/>
           </a:xfrm>
           <a:prstGeom prst="bentConnector3">
             <a:avLst/>
           </a:prstGeom>
           <a:ln>
+            <a:solidFill>
+              <a:srgbClr val="00FA00"/>
+            </a:solidFill>
             <a:headEnd type="triangle"/>
             <a:tailEnd type="triangle"/>
           </a:ln>

</xml_diff>

<commit_message>
added demo sketch 3
</commit_message>
<xml_diff>
--- a/demo_sketch.pptx
+++ b/demo_sketch.pptx
@@ -4287,7 +4287,13 @@
                 <a:rPr lang="en-US" dirty="0" smtClean="0">
                   <a:latin typeface="+mj-lt"/>
                 </a:rPr>
-                <a:t>RESTful App for Brand</a:t>
+                <a:t>RESTful App </a:t>
+              </a:r>
+              <a:r>
+                <a:rPr lang="en-US" smtClean="0">
+                  <a:latin typeface="+mj-lt"/>
+                </a:rPr>
+                <a:t>for Brand devices</a:t>
               </a:r>
               <a:endParaRPr lang="en-US" dirty="0">
                 <a:latin typeface="+mj-lt"/>

</xml_diff>